<commit_message>
Updated multipanel figure - replaced "strain" by "variant"
</commit_message>
<xml_diff>
--- a/multinomial_logistic_fits/plots/bGLM_plot secondary_attack_rates_VOC nonVOC_byage.pptx
+++ b/multinomial_logistic_fits/plots/bGLM_plot secondary_attack_rates_VOC nonVOC_byage.pptx
@@ -9098,7 +9098,7 @@
           <p:spPr>
             <a:xfrm>
               <a:off x="6875825" y="5336747"/>
-              <a:ext cx="660629" cy="83157"/>
+              <a:ext cx="724197" cy="83157"/>
             </a:xfrm>
             <a:prstGeom prst="rect">
               <a:avLst/>
@@ -9130,7 +9130,7 @@
                   <a:latin typeface="Arial"/>
                   <a:cs typeface="Arial"/>
                 </a:rPr>
-                <a:t>strain carried</a:t>
+                <a:t>variant carried</a:t>
               </a:r>
             </a:p>
           </p:txBody>

</xml_diff>